<commit_message>
pdf added, codes added to notebook
</commit_message>
<xml_diff>
--- a/introtosklearn.pptx
+++ b/introtosklearn.pptx
@@ -7,6 +7,13 @@
   <p:sldIdLst>
     <p:sldId id="256" r:id="rId2"/>
     <p:sldId id="257" r:id="rId3"/>
+    <p:sldId id="259" r:id="rId4"/>
+    <p:sldId id="258" r:id="rId5"/>
+    <p:sldId id="261" r:id="rId6"/>
+    <p:sldId id="263" r:id="rId7"/>
+    <p:sldId id="264" r:id="rId8"/>
+    <p:sldId id="260" r:id="rId9"/>
+    <p:sldId id="262" r:id="rId10"/>
   </p:sldIdLst>
   <p:sldSz cx="12192000" cy="6858000"/>
   <p:notesSz cx="6858000" cy="9144000"/>
@@ -105,6 +112,11 @@
       </a:defRPr>
     </a:lvl9pPr>
   </p:defaultTextStyle>
+  <p:extLst>
+    <p:ext uri="{EFAFB233-063F-42B5-8137-9DF3F51BA10A}">
+      <p15:sldGuideLst xmlns:p15="http://schemas.microsoft.com/office/powerpoint/2012/main"/>
+    </p:ext>
+  </p:extLst>
 </p:presentation>
 </file>
 
@@ -2980,7 +2992,15 @@
           <a:bodyPr/>
           <a:lstStyle/>
           <a:p>
-            <a:endParaRPr lang="fr-FR"/>
+            <a:r>
+              <a:rPr lang="fr-FR" dirty="0" err="1" smtClean="0"/>
+              <a:t>Scikit</a:t>
+            </a:r>
+            <a:r>
+              <a:rPr lang="fr-FR" dirty="0" smtClean="0"/>
+              <a:t>-Learn Python Package</a:t>
+            </a:r>
+            <a:endParaRPr lang="fr-FR" dirty="0"/>
           </a:p>
         </p:txBody>
       </p:sp>
@@ -3055,6 +3075,30 @@
           <a:bodyPr/>
           <a:lstStyle/>
           <a:p>
+            <a:r>
+              <a:rPr lang="fr-FR" dirty="0" err="1" smtClean="0"/>
+              <a:t>What</a:t>
+            </a:r>
+            <a:r>
+              <a:rPr lang="fr-FR" dirty="0" smtClean="0"/>
+              <a:t> </a:t>
+            </a:r>
+            <a:r>
+              <a:rPr lang="fr-FR" dirty="0" err="1" smtClean="0"/>
+              <a:t>is</a:t>
+            </a:r>
+            <a:r>
+              <a:rPr lang="fr-FR" dirty="0" smtClean="0"/>
+              <a:t> </a:t>
+            </a:r>
+            <a:r>
+              <a:rPr lang="fr-FR" dirty="0" err="1" smtClean="0"/>
+              <a:t>Scikit</a:t>
+            </a:r>
+            <a:r>
+              <a:rPr lang="fr-FR" dirty="0" smtClean="0"/>
+              <a:t>-Learn?</a:t>
+            </a:r>
             <a:endParaRPr lang="fr-FR" dirty="0"/>
           </a:p>
         </p:txBody>
@@ -3071,12 +3115,104 @@
         </p:nvSpPr>
         <p:spPr/>
         <p:txBody>
-          <a:bodyPr/>
-          <a:lstStyle/>
-          <a:p>
-            <a:r>
-              <a:rPr lang="en-US" smtClean="0"/>
-              <a:t>provides significantly more useful functionality for machine learning in general</a:t>
+          <a:bodyPr>
+            <a:normAutofit/>
+          </a:bodyPr>
+          <a:lstStyle/>
+          <a:p>
+            <a:r>
+              <a:rPr lang="en-US" dirty="0" err="1" smtClean="0"/>
+              <a:t>Scikit</a:t>
+            </a:r>
+            <a:r>
+              <a:rPr lang="en-US" dirty="0" smtClean="0"/>
+              <a:t>-learn (</a:t>
+            </a:r>
+            <a:r>
+              <a:rPr lang="en-US" dirty="0" err="1" smtClean="0"/>
+              <a:t>Sklearn</a:t>
+            </a:r>
+            <a:r>
+              <a:rPr lang="en-US" dirty="0" smtClean="0"/>
+              <a:t>) is a powerful and robust open-source machine learning library for Python.</a:t>
+            </a:r>
+            <a:br>
+              <a:rPr lang="en-US" dirty="0" smtClean="0"/>
+            </a:br>
+            <a:endParaRPr lang="en-US" dirty="0" smtClean="0"/>
+          </a:p>
+          <a:p>
+            <a:r>
+              <a:rPr lang="en-US" dirty="0" err="1" smtClean="0"/>
+              <a:t>Sklearn</a:t>
+            </a:r>
+            <a:r>
+              <a:rPr lang="en-US" dirty="0" smtClean="0"/>
+              <a:t> provides </a:t>
+            </a:r>
+            <a:r>
+              <a:rPr lang="en-US" dirty="0" smtClean="0"/>
+              <a:t>tools for efficient implementation of </a:t>
+            </a:r>
+            <a:r>
+              <a:rPr lang="en-US" dirty="0" smtClean="0"/>
+              <a:t>classification, regression, clustering and dimensionality reduction techniques.</a:t>
+            </a:r>
+            <a:br>
+              <a:rPr lang="en-US" dirty="0" smtClean="0"/>
+            </a:br>
+            <a:endParaRPr lang="en-US" dirty="0" smtClean="0"/>
+          </a:p>
+          <a:p>
+            <a:r>
+              <a:rPr lang="en-US" dirty="0" err="1" smtClean="0"/>
+              <a:t>Sklearn</a:t>
+            </a:r>
+            <a:r>
+              <a:rPr lang="en-US" dirty="0" smtClean="0"/>
+              <a:t> is written on top of </a:t>
+            </a:r>
+            <a:r>
+              <a:rPr lang="en-US" dirty="0" err="1" smtClean="0"/>
+              <a:t>NumPy</a:t>
+            </a:r>
+            <a:r>
+              <a:rPr lang="en-US" dirty="0" smtClean="0"/>
+              <a:t>, </a:t>
+            </a:r>
+            <a:r>
+              <a:rPr lang="en-US" dirty="0" err="1" smtClean="0"/>
+              <a:t>SciPy</a:t>
+            </a:r>
+            <a:r>
+              <a:rPr lang="en-US" dirty="0" smtClean="0"/>
+              <a:t> and </a:t>
+            </a:r>
+            <a:r>
+              <a:rPr lang="en-US" dirty="0" err="1" smtClean="0"/>
+              <a:t>Matplotlib</a:t>
+            </a:r>
+            <a:r>
+              <a:rPr lang="en-US" dirty="0" smtClean="0"/>
+              <a:t> packages.</a:t>
+            </a:r>
+            <a:br>
+              <a:rPr lang="en-US" dirty="0" smtClean="0"/>
+            </a:br>
+            <a:endParaRPr lang="en-US" dirty="0" smtClean="0"/>
+          </a:p>
+          <a:p>
+            <a:r>
+              <a:rPr lang="en-US" dirty="0" smtClean="0"/>
+              <a:t>Basic knowledge of these packages plus Pandas is required to successfully implement machine learning models using </a:t>
+            </a:r>
+            <a:r>
+              <a:rPr lang="en-US" dirty="0" err="1" smtClean="0"/>
+              <a:t>Sklearn</a:t>
+            </a:r>
+            <a:r>
+              <a:rPr lang="en-US" dirty="0" smtClean="0"/>
+              <a:t>.</a:t>
             </a:r>
             <a:endParaRPr lang="fr-FR" dirty="0"/>
           </a:p>
@@ -3086,6 +3222,1157 @@
     <p:extLst>
       <p:ext uri="{BB962C8B-B14F-4D97-AF65-F5344CB8AC3E}">
         <p14:creationId xmlns:p14="http://schemas.microsoft.com/office/powerpoint/2010/main" val="4286158371"/>
+      </p:ext>
+    </p:extLst>
+  </p:cSld>
+  <p:clrMapOvr>
+    <a:masterClrMapping/>
+  </p:clrMapOvr>
+  <p:timing>
+    <p:tnLst>
+      <p:par>
+        <p:cTn id="1" dur="indefinite" restart="never" nodeType="tmRoot"/>
+      </p:par>
+    </p:tnLst>
+  </p:timing>
+</p:sld>
+</file>
+
+<file path=ppt/slides/slide3.xml><?xml version="1.0" encoding="utf-8"?>
+<p:sld xmlns:a="http://schemas.openxmlformats.org/drawingml/2006/main" xmlns:r="http://schemas.openxmlformats.org/officeDocument/2006/relationships" xmlns:p="http://schemas.openxmlformats.org/presentationml/2006/main">
+  <p:cSld>
+    <p:spTree>
+      <p:nvGrpSpPr>
+        <p:cNvPr id="1" name=""/>
+        <p:cNvGrpSpPr/>
+        <p:nvPr/>
+      </p:nvGrpSpPr>
+      <p:grpSpPr>
+        <a:xfrm>
+          <a:off x="0" y="0"/>
+          <a:ext cx="0" cy="0"/>
+          <a:chOff x="0" y="0"/>
+          <a:chExt cx="0" cy="0"/>
+        </a:xfrm>
+      </p:grpSpPr>
+      <p:sp>
+        <p:nvSpPr>
+          <p:cNvPr id="2" name="Title 1"/>
+          <p:cNvSpPr>
+            <a:spLocks noGrp="1"/>
+          </p:cNvSpPr>
+          <p:nvPr>
+            <p:ph type="title"/>
+          </p:nvPr>
+        </p:nvSpPr>
+        <p:spPr/>
+        <p:txBody>
+          <a:bodyPr/>
+          <a:lstStyle/>
+          <a:p>
+            <a:r>
+              <a:rPr lang="en-CA" dirty="0" smtClean="0"/>
+              <a:t>What is </a:t>
+            </a:r>
+            <a:r>
+              <a:rPr lang="en-CA" dirty="0" err="1" smtClean="0"/>
+              <a:t>Scikit</a:t>
+            </a:r>
+            <a:r>
+              <a:rPr lang="en-CA" dirty="0" smtClean="0"/>
+              <a:t>-Learn?		</a:t>
+            </a:r>
+            <a:endParaRPr lang="en-CA" dirty="0"/>
+          </a:p>
+        </p:txBody>
+      </p:sp>
+      <p:sp>
+        <p:nvSpPr>
+          <p:cNvPr id="3" name="Content Placeholder 2"/>
+          <p:cNvSpPr>
+            <a:spLocks noGrp="1"/>
+          </p:cNvSpPr>
+          <p:nvPr>
+            <p:ph idx="1"/>
+          </p:nvPr>
+        </p:nvSpPr>
+        <p:spPr/>
+        <p:txBody>
+          <a:bodyPr>
+            <a:normAutofit lnSpcReduction="10000"/>
+          </a:bodyPr>
+          <a:lstStyle/>
+          <a:p>
+            <a:r>
+              <a:rPr lang="en-US" dirty="0" err="1"/>
+              <a:t>Sklearn</a:t>
+            </a:r>
+            <a:r>
+              <a:rPr lang="en-US" dirty="0"/>
+              <a:t> is a community project and anyone can contribute to it. </a:t>
+            </a:r>
+            <a:endParaRPr lang="en-US" dirty="0" smtClean="0"/>
+          </a:p>
+          <a:p>
+            <a:pPr marL="0" indent="0">
+              <a:buNone/>
+            </a:pPr>
+            <a:endParaRPr lang="en-US" dirty="0" smtClean="0"/>
+          </a:p>
+          <a:p>
+            <a:r>
+              <a:rPr lang="en-US" dirty="0" smtClean="0"/>
+              <a:t>Currently there are more than 2058 contributors on its </a:t>
+            </a:r>
+            <a:r>
+              <a:rPr lang="en-US" dirty="0" err="1" smtClean="0">
+                <a:hlinkClick r:id="rId2"/>
+              </a:rPr>
+              <a:t>github</a:t>
+            </a:r>
+            <a:r>
+              <a:rPr lang="en-US" dirty="0" smtClean="0">
+                <a:hlinkClick r:id="rId2"/>
+              </a:rPr>
+              <a:t> repository</a:t>
+            </a:r>
+            <a:r>
+              <a:rPr lang="en-US" dirty="0" smtClean="0"/>
+              <a:t>. </a:t>
+            </a:r>
+            <a:br>
+              <a:rPr lang="en-US" dirty="0" smtClean="0"/>
+            </a:br>
+            <a:endParaRPr lang="en-US" dirty="0" smtClean="0"/>
+          </a:p>
+          <a:p>
+            <a:r>
+              <a:rPr lang="en-US" dirty="0" smtClean="0"/>
+              <a:t>Various organizations including Booking.com, JP Morgan, Evernote, Spotify use </a:t>
+            </a:r>
+            <a:r>
+              <a:rPr lang="en-US" dirty="0" err="1" smtClean="0"/>
+              <a:t>Sklearn</a:t>
+            </a:r>
+            <a:r>
+              <a:rPr lang="en-US" dirty="0" smtClean="0"/>
+              <a:t> </a:t>
+            </a:r>
+            <a:br>
+              <a:rPr lang="en-US" dirty="0" smtClean="0"/>
+            </a:br>
+            <a:endParaRPr lang="en-US" dirty="0" smtClean="0"/>
+          </a:p>
+          <a:p>
+            <a:r>
+              <a:rPr lang="en-US" dirty="0" err="1" smtClean="0"/>
+              <a:t>Sklearn</a:t>
+            </a:r>
+            <a:r>
+              <a:rPr lang="en-US" dirty="0" smtClean="0"/>
+              <a:t> library is easy to use, offers tons of flexibility and has a very good documentation for both beginners and experts alike. </a:t>
+            </a:r>
+            <a:endParaRPr lang="en-US" dirty="0"/>
+          </a:p>
+        </p:txBody>
+      </p:sp>
+    </p:spTree>
+    <p:extLst>
+      <p:ext uri="{BB962C8B-B14F-4D97-AF65-F5344CB8AC3E}">
+        <p14:creationId xmlns:p14="http://schemas.microsoft.com/office/powerpoint/2010/main" val="2788638280"/>
+      </p:ext>
+    </p:extLst>
+  </p:cSld>
+  <p:clrMapOvr>
+    <a:masterClrMapping/>
+  </p:clrMapOvr>
+  <p:timing>
+    <p:tnLst>
+      <p:par>
+        <p:cTn id="1" dur="indefinite" restart="never" nodeType="tmRoot"/>
+      </p:par>
+    </p:tnLst>
+  </p:timing>
+</p:sld>
+</file>
+
+<file path=ppt/slides/slide4.xml><?xml version="1.0" encoding="utf-8"?>
+<p:sld xmlns:a="http://schemas.openxmlformats.org/drawingml/2006/main" xmlns:r="http://schemas.openxmlformats.org/officeDocument/2006/relationships" xmlns:p="http://schemas.openxmlformats.org/presentationml/2006/main">
+  <p:cSld>
+    <p:spTree>
+      <p:nvGrpSpPr>
+        <p:cNvPr id="1" name=""/>
+        <p:cNvGrpSpPr/>
+        <p:nvPr/>
+      </p:nvGrpSpPr>
+      <p:grpSpPr>
+        <a:xfrm>
+          <a:off x="0" y="0"/>
+          <a:ext cx="0" cy="0"/>
+          <a:chOff x="0" y="0"/>
+          <a:chExt cx="0" cy="0"/>
+        </a:xfrm>
+      </p:grpSpPr>
+      <p:sp>
+        <p:nvSpPr>
+          <p:cNvPr id="2" name="Title 1"/>
+          <p:cNvSpPr>
+            <a:spLocks noGrp="1"/>
+          </p:cNvSpPr>
+          <p:nvPr>
+            <p:ph type="title"/>
+          </p:nvPr>
+        </p:nvSpPr>
+        <p:spPr/>
+        <p:txBody>
+          <a:bodyPr/>
+          <a:lstStyle/>
+          <a:p>
+            <a:r>
+              <a:rPr lang="en-CA" dirty="0" smtClean="0"/>
+              <a:t>Origins of </a:t>
+            </a:r>
+            <a:r>
+              <a:rPr lang="en-CA" dirty="0" err="1" smtClean="0"/>
+              <a:t>Sklearn</a:t>
+            </a:r>
+            <a:r>
+              <a:rPr lang="en-CA" dirty="0" smtClean="0"/>
+              <a:t>		</a:t>
+            </a:r>
+            <a:endParaRPr lang="en-CA" dirty="0"/>
+          </a:p>
+        </p:txBody>
+      </p:sp>
+      <p:sp>
+        <p:nvSpPr>
+          <p:cNvPr id="3" name="Content Placeholder 2"/>
+          <p:cNvSpPr>
+            <a:spLocks noGrp="1"/>
+          </p:cNvSpPr>
+          <p:nvPr>
+            <p:ph idx="1"/>
+          </p:nvPr>
+        </p:nvSpPr>
+        <p:spPr/>
+        <p:txBody>
+          <a:bodyPr/>
+          <a:lstStyle/>
+          <a:p>
+            <a:r>
+              <a:rPr lang="en-US" dirty="0" smtClean="0"/>
+              <a:t>2007: Initially developed by David </a:t>
+            </a:r>
+            <a:r>
+              <a:rPr lang="en-US" dirty="0" err="1" smtClean="0"/>
+              <a:t>Cournapeau</a:t>
+            </a:r>
+            <a:r>
+              <a:rPr lang="en-US" dirty="0" smtClean="0"/>
+              <a:t> as Google summer of code project</a:t>
+            </a:r>
+            <a:br>
+              <a:rPr lang="en-US" dirty="0" smtClean="0"/>
+            </a:br>
+            <a:endParaRPr lang="en-US" dirty="0" smtClean="0"/>
+          </a:p>
+          <a:p>
+            <a:r>
+              <a:rPr lang="en-US" dirty="0" smtClean="0"/>
+              <a:t>2010: French Institute for Research in Computer Science and Automation took this to another level as they made the first public release of v0.1</a:t>
+            </a:r>
+            <a:br>
+              <a:rPr lang="en-US" dirty="0" smtClean="0"/>
+            </a:br>
+            <a:endParaRPr lang="en-US" dirty="0" smtClean="0"/>
+          </a:p>
+          <a:p>
+            <a:r>
+              <a:rPr lang="en-US" dirty="0" smtClean="0"/>
+              <a:t>2021: the latest </a:t>
+            </a:r>
+            <a:r>
+              <a:rPr lang="en-US" dirty="0" err="1" smtClean="0"/>
+              <a:t>sklearn</a:t>
+            </a:r>
+            <a:r>
+              <a:rPr lang="en-US" dirty="0" smtClean="0"/>
+              <a:t> version is 0.21.0 after 12 versions of iterations and improvement </a:t>
+            </a:r>
+          </a:p>
+        </p:txBody>
+      </p:sp>
+    </p:spTree>
+    <p:extLst>
+      <p:ext uri="{BB962C8B-B14F-4D97-AF65-F5344CB8AC3E}">
+        <p14:creationId xmlns:p14="http://schemas.microsoft.com/office/powerpoint/2010/main" val="912015011"/>
+      </p:ext>
+    </p:extLst>
+  </p:cSld>
+  <p:clrMapOvr>
+    <a:masterClrMapping/>
+  </p:clrMapOvr>
+  <p:timing>
+    <p:tnLst>
+      <p:par>
+        <p:cTn id="1" dur="indefinite" restart="never" nodeType="tmRoot"/>
+      </p:par>
+    </p:tnLst>
+  </p:timing>
+</p:sld>
+</file>
+
+<file path=ppt/slides/slide5.xml><?xml version="1.0" encoding="utf-8"?>
+<p:sld xmlns:a="http://schemas.openxmlformats.org/drawingml/2006/main" xmlns:r="http://schemas.openxmlformats.org/officeDocument/2006/relationships" xmlns:p="http://schemas.openxmlformats.org/presentationml/2006/main">
+  <p:cSld>
+    <p:spTree>
+      <p:nvGrpSpPr>
+        <p:cNvPr id="1" name=""/>
+        <p:cNvGrpSpPr/>
+        <p:nvPr/>
+      </p:nvGrpSpPr>
+      <p:grpSpPr>
+        <a:xfrm>
+          <a:off x="0" y="0"/>
+          <a:ext cx="0" cy="0"/>
+          <a:chOff x="0" y="0"/>
+          <a:chExt cx="0" cy="0"/>
+        </a:xfrm>
+      </p:grpSpPr>
+      <p:sp>
+        <p:nvSpPr>
+          <p:cNvPr id="2" name="Title 1"/>
+          <p:cNvSpPr>
+            <a:spLocks noGrp="1"/>
+          </p:cNvSpPr>
+          <p:nvPr>
+            <p:ph type="title"/>
+          </p:nvPr>
+        </p:nvSpPr>
+        <p:spPr/>
+        <p:txBody>
+          <a:bodyPr/>
+          <a:lstStyle/>
+          <a:p>
+            <a:r>
+              <a:rPr lang="en-CA" dirty="0" smtClean="0"/>
+              <a:t>Data Modelling</a:t>
+            </a:r>
+            <a:endParaRPr lang="en-CA" dirty="0"/>
+          </a:p>
+        </p:txBody>
+      </p:sp>
+      <p:sp>
+        <p:nvSpPr>
+          <p:cNvPr id="3" name="Content Placeholder 2"/>
+          <p:cNvSpPr>
+            <a:spLocks noGrp="1"/>
+          </p:cNvSpPr>
+          <p:nvPr>
+            <p:ph idx="1"/>
+          </p:nvPr>
+        </p:nvSpPr>
+        <p:spPr/>
+        <p:txBody>
+          <a:bodyPr>
+            <a:normAutofit lnSpcReduction="10000"/>
+          </a:bodyPr>
+          <a:lstStyle/>
+          <a:p>
+            <a:r>
+              <a:rPr lang="en-CA" dirty="0" err="1" smtClean="0"/>
+              <a:t>Sklearn</a:t>
+            </a:r>
+            <a:r>
+              <a:rPr lang="en-CA" dirty="0" smtClean="0"/>
+              <a:t> is focused on modelling data and offers plethora of tools for that:</a:t>
+            </a:r>
+          </a:p>
+          <a:p>
+            <a:pPr lvl="1"/>
+            <a:r>
+              <a:rPr lang="en-CA" dirty="0" smtClean="0"/>
+              <a:t>Supervised machine learning algorithms</a:t>
+            </a:r>
+          </a:p>
+          <a:p>
+            <a:pPr lvl="1"/>
+            <a:r>
+              <a:rPr lang="en-CA" dirty="0" smtClean="0"/>
+              <a:t>Unsupervised machine learning algorithms</a:t>
+            </a:r>
+          </a:p>
+          <a:p>
+            <a:pPr lvl="1"/>
+            <a:r>
+              <a:rPr lang="en-CA" dirty="0" smtClean="0"/>
+              <a:t>Clustering </a:t>
+            </a:r>
+          </a:p>
+          <a:p>
+            <a:pPr lvl="1"/>
+            <a:r>
+              <a:rPr lang="en-CA" dirty="0" smtClean="0"/>
+              <a:t>Cross validation</a:t>
+            </a:r>
+          </a:p>
+          <a:p>
+            <a:pPr lvl="1"/>
+            <a:r>
+              <a:rPr lang="en-CA" dirty="0" smtClean="0"/>
+              <a:t>Dimensionality reduction</a:t>
+            </a:r>
+          </a:p>
+          <a:p>
+            <a:pPr lvl="1"/>
+            <a:r>
+              <a:rPr lang="en-CA" dirty="0" smtClean="0"/>
+              <a:t>Ensemble methods </a:t>
+            </a:r>
+          </a:p>
+          <a:p>
+            <a:r>
+              <a:rPr lang="en-CA" dirty="0" err="1" smtClean="0"/>
+              <a:t>Sklearn</a:t>
+            </a:r>
+            <a:r>
+              <a:rPr lang="en-CA" dirty="0" smtClean="0"/>
+              <a:t> also offered preprocessing support:</a:t>
+            </a:r>
+          </a:p>
+          <a:p>
+            <a:pPr lvl="1"/>
+            <a:r>
+              <a:rPr lang="en-CA" dirty="0" smtClean="0"/>
+              <a:t>Data encoding</a:t>
+            </a:r>
+          </a:p>
+          <a:p>
+            <a:pPr lvl="1"/>
+            <a:r>
+              <a:rPr lang="en-CA" dirty="0" smtClean="0"/>
+              <a:t>Feature selection / extraction</a:t>
+            </a:r>
+            <a:endParaRPr lang="en-CA" dirty="0"/>
+          </a:p>
+        </p:txBody>
+      </p:sp>
+    </p:spTree>
+    <p:extLst>
+      <p:ext uri="{BB962C8B-B14F-4D97-AF65-F5344CB8AC3E}">
+        <p14:creationId xmlns:p14="http://schemas.microsoft.com/office/powerpoint/2010/main" val="3998585335"/>
+      </p:ext>
+    </p:extLst>
+  </p:cSld>
+  <p:clrMapOvr>
+    <a:masterClrMapping/>
+  </p:clrMapOvr>
+  <p:timing>
+    <p:tnLst>
+      <p:par>
+        <p:cTn id="1" dur="indefinite" restart="never" nodeType="tmRoot"/>
+      </p:par>
+    </p:tnLst>
+  </p:timing>
+</p:sld>
+</file>
+
+<file path=ppt/slides/slide6.xml><?xml version="1.0" encoding="utf-8"?>
+<p:sld xmlns:a="http://schemas.openxmlformats.org/drawingml/2006/main" xmlns:r="http://schemas.openxmlformats.org/officeDocument/2006/relationships" xmlns:p="http://schemas.openxmlformats.org/presentationml/2006/main">
+  <p:cSld>
+    <p:spTree>
+      <p:nvGrpSpPr>
+        <p:cNvPr id="1" name=""/>
+        <p:cNvGrpSpPr/>
+        <p:nvPr/>
+      </p:nvGrpSpPr>
+      <p:grpSpPr>
+        <a:xfrm>
+          <a:off x="0" y="0"/>
+          <a:ext cx="0" cy="0"/>
+          <a:chOff x="0" y="0"/>
+          <a:chExt cx="0" cy="0"/>
+        </a:xfrm>
+      </p:grpSpPr>
+      <p:sp>
+        <p:nvSpPr>
+          <p:cNvPr id="2" name="Title 1"/>
+          <p:cNvSpPr>
+            <a:spLocks noGrp="1"/>
+          </p:cNvSpPr>
+          <p:nvPr>
+            <p:ph type="title"/>
+          </p:nvPr>
+        </p:nvSpPr>
+        <p:spPr/>
+        <p:txBody>
+          <a:bodyPr/>
+          <a:lstStyle/>
+          <a:p>
+            <a:r>
+              <a:rPr lang="en-CA" dirty="0" smtClean="0"/>
+              <a:t>Machine Learning</a:t>
+            </a:r>
+            <a:endParaRPr lang="en-CA" dirty="0"/>
+          </a:p>
+        </p:txBody>
+      </p:sp>
+      <p:sp>
+        <p:nvSpPr>
+          <p:cNvPr id="3" name="Content Placeholder 2"/>
+          <p:cNvSpPr>
+            <a:spLocks noGrp="1"/>
+          </p:cNvSpPr>
+          <p:nvPr>
+            <p:ph idx="1"/>
+          </p:nvPr>
+        </p:nvSpPr>
+        <p:spPr/>
+        <p:txBody>
+          <a:bodyPr>
+            <a:normAutofit/>
+          </a:bodyPr>
+          <a:lstStyle/>
+          <a:p>
+            <a:r>
+              <a:rPr lang="en-CA" dirty="0" smtClean="0"/>
+              <a:t>Machine Learning (ML) is a study of algorithms that can learn to solve a specified task using data.</a:t>
+            </a:r>
+          </a:p>
+          <a:p>
+            <a:r>
+              <a:rPr lang="en-CA" dirty="0" smtClean="0"/>
+              <a:t>ML models are trained using a sample of historical data called the training data and the model itself is evaluated based on its performance on an unseen data called the test data.  </a:t>
+            </a:r>
+          </a:p>
+          <a:p>
+            <a:r>
+              <a:rPr lang="en-CA" dirty="0" smtClean="0"/>
+              <a:t>ML has wide variety of application from research to health to finance to speech recognition and language translation. </a:t>
+            </a:r>
+          </a:p>
+          <a:p>
+            <a:endParaRPr lang="en-CA" dirty="0"/>
+          </a:p>
+        </p:txBody>
+      </p:sp>
+    </p:spTree>
+    <p:extLst>
+      <p:ext uri="{BB962C8B-B14F-4D97-AF65-F5344CB8AC3E}">
+        <p14:creationId xmlns:p14="http://schemas.microsoft.com/office/powerpoint/2010/main" val="206430534"/>
+      </p:ext>
+    </p:extLst>
+  </p:cSld>
+  <p:clrMapOvr>
+    <a:masterClrMapping/>
+  </p:clrMapOvr>
+  <p:timing>
+    <p:tnLst>
+      <p:par>
+        <p:cTn id="1" dur="indefinite" restart="never" nodeType="tmRoot"/>
+      </p:par>
+    </p:tnLst>
+  </p:timing>
+</p:sld>
+</file>
+
+<file path=ppt/slides/slide7.xml><?xml version="1.0" encoding="utf-8"?>
+<p:sld xmlns:a="http://schemas.openxmlformats.org/drawingml/2006/main" xmlns:r="http://schemas.openxmlformats.org/officeDocument/2006/relationships" xmlns:p="http://schemas.openxmlformats.org/presentationml/2006/main">
+  <p:cSld>
+    <p:spTree>
+      <p:nvGrpSpPr>
+        <p:cNvPr id="1" name=""/>
+        <p:cNvGrpSpPr/>
+        <p:nvPr/>
+      </p:nvGrpSpPr>
+      <p:grpSpPr>
+        <a:xfrm>
+          <a:off x="0" y="0"/>
+          <a:ext cx="0" cy="0"/>
+          <a:chOff x="0" y="0"/>
+          <a:chExt cx="0" cy="0"/>
+        </a:xfrm>
+      </p:grpSpPr>
+      <p:sp>
+        <p:nvSpPr>
+          <p:cNvPr id="2" name="Title 1"/>
+          <p:cNvSpPr>
+            <a:spLocks noGrp="1"/>
+          </p:cNvSpPr>
+          <p:nvPr>
+            <p:ph type="title"/>
+          </p:nvPr>
+        </p:nvSpPr>
+        <p:spPr/>
+        <p:txBody>
+          <a:bodyPr/>
+          <a:lstStyle/>
+          <a:p>
+            <a:r>
+              <a:rPr lang="en-CA" dirty="0" smtClean="0"/>
+              <a:t>Machine Learning</a:t>
+            </a:r>
+            <a:endParaRPr lang="en-CA" dirty="0"/>
+          </a:p>
+        </p:txBody>
+      </p:sp>
+      <p:sp>
+        <p:nvSpPr>
+          <p:cNvPr id="3" name="Content Placeholder 2"/>
+          <p:cNvSpPr>
+            <a:spLocks noGrp="1"/>
+          </p:cNvSpPr>
+          <p:nvPr>
+            <p:ph idx="1"/>
+          </p:nvPr>
+        </p:nvSpPr>
+        <p:spPr/>
+        <p:txBody>
+          <a:bodyPr>
+            <a:normAutofit/>
+          </a:bodyPr>
+          <a:lstStyle/>
+          <a:p>
+            <a:r>
+              <a:rPr lang="en-CA" dirty="0"/>
+              <a:t>There are two main types of ML models:</a:t>
+            </a:r>
+          </a:p>
+          <a:p>
+            <a:pPr marL="914400" lvl="1" indent="-457200">
+              <a:buFont typeface="+mj-lt"/>
+              <a:buAutoNum type="arabicPeriod"/>
+            </a:pPr>
+            <a:r>
+              <a:rPr lang="en-CA" dirty="0"/>
+              <a:t>Supervised: </a:t>
+            </a:r>
+            <a:endParaRPr lang="en-CA" dirty="0" smtClean="0"/>
+          </a:p>
+          <a:p>
+            <a:pPr lvl="2">
+              <a:buFont typeface="Wingdings" panose="05000000000000000000" pitchFamily="2" charset="2"/>
+              <a:buChar char="Ø"/>
+            </a:pPr>
+            <a:r>
+              <a:rPr lang="en-CA" dirty="0" smtClean="0"/>
+              <a:t>Model </a:t>
+            </a:r>
+            <a:r>
+              <a:rPr lang="en-CA" dirty="0"/>
+              <a:t>learns to identify pattern in data using inputs and desired </a:t>
+            </a:r>
+            <a:r>
+              <a:rPr lang="en-CA" dirty="0" smtClean="0"/>
+              <a:t>outputs called </a:t>
+            </a:r>
+            <a:r>
+              <a:rPr lang="en-CA" smtClean="0"/>
+              <a:t>labels.</a:t>
+            </a:r>
+            <a:br>
+              <a:rPr lang="en-CA" smtClean="0"/>
+            </a:br>
+            <a:endParaRPr lang="en-CA" dirty="0" smtClean="0"/>
+          </a:p>
+          <a:p>
+            <a:pPr marL="914400" lvl="1" indent="-457200">
+              <a:buFont typeface="+mj-lt"/>
+              <a:buAutoNum type="arabicPeriod"/>
+            </a:pPr>
+            <a:r>
+              <a:rPr lang="en-CA" dirty="0" smtClean="0"/>
+              <a:t>Unsupervised:</a:t>
+            </a:r>
+          </a:p>
+          <a:p>
+            <a:pPr lvl="2">
+              <a:buFont typeface="Wingdings" panose="05000000000000000000" pitchFamily="2" charset="2"/>
+              <a:buChar char="Ø"/>
+            </a:pPr>
+            <a:r>
+              <a:rPr lang="en-CA" dirty="0" smtClean="0"/>
+              <a:t> </a:t>
+            </a:r>
+            <a:r>
+              <a:rPr lang="en-CA" dirty="0"/>
+              <a:t>Model learns to identify pattern and structure in the data without any labels</a:t>
+            </a:r>
+          </a:p>
+        </p:txBody>
+      </p:sp>
+    </p:spTree>
+    <p:extLst>
+      <p:ext uri="{BB962C8B-B14F-4D97-AF65-F5344CB8AC3E}">
+        <p14:creationId xmlns:p14="http://schemas.microsoft.com/office/powerpoint/2010/main" val="443384524"/>
+      </p:ext>
+    </p:extLst>
+  </p:cSld>
+  <p:clrMapOvr>
+    <a:masterClrMapping/>
+  </p:clrMapOvr>
+  <p:timing>
+    <p:tnLst>
+      <p:par>
+        <p:cTn id="1" dur="indefinite" restart="never" nodeType="tmRoot"/>
+      </p:par>
+    </p:tnLst>
+  </p:timing>
+</p:sld>
+</file>
+
+<file path=ppt/slides/slide8.xml><?xml version="1.0" encoding="utf-8"?>
+<p:sld xmlns:a="http://schemas.openxmlformats.org/drawingml/2006/main" xmlns:r="http://schemas.openxmlformats.org/officeDocument/2006/relationships" xmlns:p="http://schemas.openxmlformats.org/presentationml/2006/main">
+  <p:cSld>
+    <p:spTree>
+      <p:nvGrpSpPr>
+        <p:cNvPr id="1" name=""/>
+        <p:cNvGrpSpPr/>
+        <p:nvPr/>
+      </p:nvGrpSpPr>
+      <p:grpSpPr>
+        <a:xfrm>
+          <a:off x="0" y="0"/>
+          <a:ext cx="0" cy="0"/>
+          <a:chOff x="0" y="0"/>
+          <a:chExt cx="0" cy="0"/>
+        </a:xfrm>
+      </p:grpSpPr>
+      <p:sp>
+        <p:nvSpPr>
+          <p:cNvPr id="2" name="Title 1"/>
+          <p:cNvSpPr>
+            <a:spLocks noGrp="1"/>
+          </p:cNvSpPr>
+          <p:nvPr>
+            <p:ph type="title"/>
+          </p:nvPr>
+        </p:nvSpPr>
+        <p:spPr/>
+        <p:txBody>
+          <a:bodyPr/>
+          <a:lstStyle/>
+          <a:p>
+            <a:r>
+              <a:rPr lang="en-CA" dirty="0" smtClean="0"/>
+              <a:t>Install </a:t>
+            </a:r>
+            <a:r>
+              <a:rPr lang="en-CA" dirty="0" err="1" smtClean="0"/>
+              <a:t>Sklearn</a:t>
+            </a:r>
+            <a:r>
+              <a:rPr lang="en-CA" dirty="0"/>
+              <a:t> </a:t>
+            </a:r>
+            <a:r>
+              <a:rPr lang="en-CA" dirty="0" smtClean="0"/>
+              <a:t>using Anaconda</a:t>
+            </a:r>
+            <a:endParaRPr lang="en-CA" dirty="0"/>
+          </a:p>
+        </p:txBody>
+      </p:sp>
+      <p:sp>
+        <p:nvSpPr>
+          <p:cNvPr id="3" name="Content Placeholder 2"/>
+          <p:cNvSpPr>
+            <a:spLocks noGrp="1"/>
+          </p:cNvSpPr>
+          <p:nvPr>
+            <p:ph idx="1"/>
+          </p:nvPr>
+        </p:nvSpPr>
+        <p:spPr/>
+        <p:txBody>
+          <a:bodyPr/>
+          <a:lstStyle/>
+          <a:p>
+            <a:r>
+              <a:rPr lang="en-US" dirty="0" err="1"/>
+              <a:t>c</a:t>
+            </a:r>
+            <a:r>
+              <a:rPr lang="en-US" dirty="0" err="1" smtClean="0"/>
+              <a:t>onda</a:t>
+            </a:r>
+            <a:r>
+              <a:rPr lang="en-US" dirty="0" smtClean="0"/>
+              <a:t> install </a:t>
+            </a:r>
+            <a:r>
+              <a:rPr lang="en-US" dirty="0" err="1" smtClean="0"/>
+              <a:t>scikit</a:t>
+            </a:r>
+            <a:r>
+              <a:rPr lang="en-US" dirty="0" smtClean="0"/>
+              <a:t>-learn </a:t>
+            </a:r>
+            <a:br>
+              <a:rPr lang="en-US" dirty="0" smtClean="0"/>
+            </a:br>
+            <a:endParaRPr lang="en-US" dirty="0" smtClean="0"/>
+          </a:p>
+          <a:p>
+            <a:r>
+              <a:rPr lang="en-US" dirty="0" smtClean="0"/>
+              <a:t>Prerequisite packages are installed</a:t>
+            </a:r>
+            <a:endParaRPr lang="en-US" dirty="0"/>
+          </a:p>
+        </p:txBody>
+      </p:sp>
+    </p:spTree>
+    <p:extLst>
+      <p:ext uri="{BB962C8B-B14F-4D97-AF65-F5344CB8AC3E}">
+        <p14:creationId xmlns:p14="http://schemas.microsoft.com/office/powerpoint/2010/main" val="495184926"/>
+      </p:ext>
+    </p:extLst>
+  </p:cSld>
+  <p:clrMapOvr>
+    <a:masterClrMapping/>
+  </p:clrMapOvr>
+  <p:timing>
+    <p:tnLst>
+      <p:par>
+        <p:cTn id="1" dur="indefinite" restart="never" nodeType="tmRoot"/>
+      </p:par>
+    </p:tnLst>
+  </p:timing>
+</p:sld>
+</file>
+
+<file path=ppt/slides/slide9.xml><?xml version="1.0" encoding="utf-8"?>
+<p:sld xmlns:a="http://schemas.openxmlformats.org/drawingml/2006/main" xmlns:r="http://schemas.openxmlformats.org/officeDocument/2006/relationships" xmlns:p="http://schemas.openxmlformats.org/presentationml/2006/main">
+  <p:cSld>
+    <p:spTree>
+      <p:nvGrpSpPr>
+        <p:cNvPr id="1" name=""/>
+        <p:cNvGrpSpPr/>
+        <p:nvPr/>
+      </p:nvGrpSpPr>
+      <p:grpSpPr>
+        <a:xfrm>
+          <a:off x="0" y="0"/>
+          <a:ext cx="0" cy="0"/>
+          <a:chOff x="0" y="0"/>
+          <a:chExt cx="0" cy="0"/>
+        </a:xfrm>
+      </p:grpSpPr>
+      <p:sp>
+        <p:nvSpPr>
+          <p:cNvPr id="2" name="Title 1"/>
+          <p:cNvSpPr>
+            <a:spLocks noGrp="1"/>
+          </p:cNvSpPr>
+          <p:nvPr>
+            <p:ph type="title"/>
+          </p:nvPr>
+        </p:nvSpPr>
+        <p:spPr/>
+        <p:txBody>
+          <a:bodyPr/>
+          <a:lstStyle/>
+          <a:p>
+            <a:r>
+              <a:rPr lang="en-CA" dirty="0" smtClean="0"/>
+              <a:t>Additional resources</a:t>
+            </a:r>
+            <a:endParaRPr lang="en-CA" dirty="0"/>
+          </a:p>
+        </p:txBody>
+      </p:sp>
+      <p:sp>
+        <p:nvSpPr>
+          <p:cNvPr id="3" name="Content Placeholder 2"/>
+          <p:cNvSpPr>
+            <a:spLocks noGrp="1"/>
+          </p:cNvSpPr>
+          <p:nvPr>
+            <p:ph idx="1"/>
+          </p:nvPr>
+        </p:nvSpPr>
+        <p:spPr/>
+        <p:txBody>
+          <a:bodyPr>
+            <a:normAutofit fontScale="92500" lnSpcReduction="20000"/>
+          </a:bodyPr>
+          <a:lstStyle/>
+          <a:p>
+            <a:r>
+              <a:rPr lang="en-US" dirty="0" smtClean="0"/>
+              <a:t>Tutorials:</a:t>
+            </a:r>
+          </a:p>
+          <a:p>
+            <a:pPr lvl="1"/>
+            <a:r>
+              <a:rPr lang="en-US" dirty="0" smtClean="0"/>
+              <a:t>Quick </a:t>
+            </a:r>
+            <a:r>
+              <a:rPr lang="en-US" dirty="0"/>
+              <a:t>Start Tutorial </a:t>
+            </a:r>
+            <a:r>
+              <a:rPr lang="en-US" dirty="0">
+                <a:hlinkClick r:id="rId2"/>
+              </a:rPr>
+              <a:t>http://scikit-learn.org/stable/tutorial/basic/tutorial.html</a:t>
+            </a:r>
+            <a:endParaRPr lang="en-US" dirty="0"/>
+          </a:p>
+          <a:p>
+            <a:pPr lvl="1"/>
+            <a:r>
+              <a:rPr lang="en-US" dirty="0"/>
+              <a:t>User Guide </a:t>
+            </a:r>
+            <a:r>
+              <a:rPr lang="en-US" dirty="0">
+                <a:hlinkClick r:id="rId3"/>
+              </a:rPr>
+              <a:t>http://scikit-learn.org/stable/user_guide.html</a:t>
+            </a:r>
+            <a:endParaRPr lang="en-US" dirty="0"/>
+          </a:p>
+          <a:p>
+            <a:pPr lvl="1"/>
+            <a:r>
+              <a:rPr lang="en-US" dirty="0"/>
+              <a:t>API Reference </a:t>
+            </a:r>
+            <a:r>
+              <a:rPr lang="en-US" dirty="0">
+                <a:hlinkClick r:id="rId4"/>
+              </a:rPr>
+              <a:t>http://scikit-learn.org/stable/modules/classes.html</a:t>
+            </a:r>
+            <a:endParaRPr lang="en-US" dirty="0"/>
+          </a:p>
+          <a:p>
+            <a:pPr lvl="1"/>
+            <a:r>
+              <a:rPr lang="en-US" dirty="0"/>
+              <a:t>Example Gallery </a:t>
+            </a:r>
+            <a:r>
+              <a:rPr lang="en-US" dirty="0">
+                <a:hlinkClick r:id="rId5"/>
+              </a:rPr>
+              <a:t>http://</a:t>
+            </a:r>
+            <a:r>
+              <a:rPr lang="en-US" dirty="0" smtClean="0">
+                <a:hlinkClick r:id="rId5"/>
+              </a:rPr>
+              <a:t>scikit-learn.org/stable/auto_examples/index.html</a:t>
+            </a:r>
+          </a:p>
+          <a:p>
+            <a:pPr lvl="1"/>
+            <a:r>
+              <a:rPr lang="fr-FR" dirty="0" err="1">
+                <a:hlinkClick r:id="rId6"/>
+              </a:rPr>
+              <a:t>PyCon</a:t>
+            </a:r>
+            <a:r>
+              <a:rPr lang="fr-FR" dirty="0">
+                <a:hlinkClick r:id="rId6"/>
+              </a:rPr>
+              <a:t> 2014 </a:t>
+            </a:r>
+            <a:r>
+              <a:rPr lang="fr-FR" dirty="0" err="1">
+                <a:hlinkClick r:id="rId6"/>
+              </a:rPr>
+              <a:t>Scikit-learn</a:t>
+            </a:r>
+            <a:r>
+              <a:rPr lang="fr-FR" dirty="0">
+                <a:hlinkClick r:id="rId6"/>
+              </a:rPr>
+              <a:t> Tutorial</a:t>
+            </a:r>
+            <a:r>
+              <a:rPr lang="fr-FR" dirty="0"/>
+              <a:t> by </a:t>
+            </a:r>
+            <a:r>
+              <a:rPr lang="fr-FR" dirty="0" err="1"/>
+              <a:t>Jake</a:t>
+            </a:r>
+            <a:r>
+              <a:rPr lang="fr-FR" dirty="0"/>
+              <a:t> </a:t>
+            </a:r>
+            <a:r>
+              <a:rPr lang="fr-FR" dirty="0" err="1"/>
+              <a:t>VanderPlas</a:t>
+            </a:r>
+            <a:endParaRPr lang="fr-FR" dirty="0"/>
+          </a:p>
+          <a:p>
+            <a:pPr lvl="1"/>
+            <a:r>
+              <a:rPr lang="fr-FR" dirty="0" err="1">
+                <a:hlinkClick r:id="rId7"/>
+              </a:rPr>
+              <a:t>Parallel</a:t>
+            </a:r>
+            <a:r>
+              <a:rPr lang="fr-FR" dirty="0">
+                <a:hlinkClick r:id="rId7"/>
+              </a:rPr>
+              <a:t> Machine Learning </a:t>
+            </a:r>
+            <a:r>
+              <a:rPr lang="fr-FR" dirty="0" err="1">
+                <a:hlinkClick r:id="rId7"/>
+              </a:rPr>
+              <a:t>with</a:t>
+            </a:r>
+            <a:r>
+              <a:rPr lang="fr-FR" dirty="0">
+                <a:hlinkClick r:id="rId7"/>
+              </a:rPr>
+              <a:t> </a:t>
+            </a:r>
+            <a:r>
+              <a:rPr lang="fr-FR" dirty="0" err="1">
+                <a:hlinkClick r:id="rId7"/>
+              </a:rPr>
+              <a:t>scikit-learn</a:t>
+            </a:r>
+            <a:r>
+              <a:rPr lang="fr-FR" dirty="0">
+                <a:hlinkClick r:id="rId7"/>
+              </a:rPr>
+              <a:t> and </a:t>
+            </a:r>
+            <a:r>
+              <a:rPr lang="fr-FR" dirty="0" err="1">
+                <a:hlinkClick r:id="rId7"/>
+              </a:rPr>
+              <a:t>IPython</a:t>
+            </a:r>
+            <a:r>
+              <a:rPr lang="fr-FR" dirty="0"/>
+              <a:t> by Olivier </a:t>
+            </a:r>
+            <a:r>
+              <a:rPr lang="fr-FR" dirty="0" err="1"/>
+              <a:t>Grisel</a:t>
+            </a:r>
+            <a:r>
+              <a:rPr lang="fr-FR" dirty="0"/>
+              <a:t> (</a:t>
+            </a:r>
+            <a:r>
+              <a:rPr lang="fr-FR" dirty="0" err="1"/>
+              <a:t>also</a:t>
+            </a:r>
+            <a:r>
+              <a:rPr lang="fr-FR" dirty="0"/>
+              <a:t> </a:t>
+            </a:r>
+            <a:r>
+              <a:rPr lang="fr-FR" dirty="0" err="1"/>
+              <a:t>offered</a:t>
+            </a:r>
+            <a:r>
+              <a:rPr lang="fr-FR" dirty="0"/>
+              <a:t> at </a:t>
+            </a:r>
+            <a:r>
+              <a:rPr lang="fr-FR" dirty="0" err="1"/>
+              <a:t>Strata</a:t>
+            </a:r>
+            <a:r>
+              <a:rPr lang="fr-FR" dirty="0"/>
+              <a:t> 2014</a:t>
+            </a:r>
+            <a:r>
+              <a:rPr lang="fr-FR" dirty="0" smtClean="0"/>
+              <a:t>)</a:t>
+            </a:r>
+            <a:br>
+              <a:rPr lang="fr-FR" dirty="0" smtClean="0"/>
+            </a:br>
+            <a:endParaRPr lang="en-US" dirty="0" smtClean="0">
+              <a:hlinkClick r:id="rId5"/>
+            </a:endParaRPr>
+          </a:p>
+          <a:p>
+            <a:r>
+              <a:rPr lang="en-US" dirty="0" smtClean="0"/>
+              <a:t>Books:</a:t>
+            </a:r>
+            <a:endParaRPr lang="en-US" dirty="0">
+              <a:hlinkClick r:id="rId5"/>
+            </a:endParaRPr>
+          </a:p>
+          <a:p>
+            <a:pPr lvl="1"/>
+            <a:r>
+              <a:rPr lang="en-US" dirty="0">
+                <a:hlinkClick r:id="rId8"/>
+              </a:rPr>
+              <a:t>Learning </a:t>
+            </a:r>
+            <a:r>
+              <a:rPr lang="en-US" dirty="0" err="1">
+                <a:hlinkClick r:id="rId8"/>
+              </a:rPr>
+              <a:t>scikit</a:t>
+            </a:r>
+            <a:r>
+              <a:rPr lang="en-US" dirty="0">
+                <a:hlinkClick r:id="rId8"/>
+              </a:rPr>
+              <a:t>-learn: Machine Learning in Python</a:t>
+            </a:r>
+            <a:r>
+              <a:rPr lang="en-US" dirty="0"/>
+              <a:t> (2013)</a:t>
+            </a:r>
+          </a:p>
+          <a:p>
+            <a:pPr lvl="1"/>
+            <a:r>
+              <a:rPr lang="en-US" dirty="0">
+                <a:hlinkClick r:id="rId9"/>
+              </a:rPr>
+              <a:t>Building Machine Learning Systems with Python</a:t>
+            </a:r>
+            <a:r>
+              <a:rPr lang="en-US" dirty="0"/>
+              <a:t> (2013)</a:t>
+            </a:r>
+          </a:p>
+          <a:p>
+            <a:pPr lvl="1"/>
+            <a:r>
+              <a:rPr lang="en-US" dirty="0">
+                <a:hlinkClick r:id="rId10"/>
+              </a:rPr>
+              <a:t>Statistics, Data Mining, and Machine Learning in Astronomy: A Practical Python Guide for the Analysis of Survey Data</a:t>
+            </a:r>
+            <a:r>
+              <a:rPr lang="en-US" dirty="0"/>
+              <a:t> (2014).</a:t>
+            </a:r>
+          </a:p>
+          <a:p>
+            <a:endParaRPr lang="en-US" dirty="0"/>
+          </a:p>
+        </p:txBody>
+      </p:sp>
+    </p:spTree>
+    <p:extLst>
+      <p:ext uri="{BB962C8B-B14F-4D97-AF65-F5344CB8AC3E}">
+        <p14:creationId xmlns:p14="http://schemas.microsoft.com/office/powerpoint/2010/main" val="585693280"/>
       </p:ext>
     </p:extLst>
   </p:cSld>

</xml_diff>